<commit_message>
add text match code
</commit_message>
<xml_diff>
--- a/孙相会.pptx
+++ b/孙相会.pptx
@@ -28,15 +28,17 @@
     <p:sldId id="494" r:id="rId21"/>
     <p:sldId id="499" r:id="rId22"/>
     <p:sldId id="511" r:id="rId23"/>
-    <p:sldId id="396" r:id="rId24"/>
-    <p:sldId id="397" r:id="rId25"/>
-    <p:sldId id="454" r:id="rId26"/>
-    <p:sldId id="398" r:id="rId27"/>
-    <p:sldId id="399" r:id="rId28"/>
-    <p:sldId id="404" r:id="rId29"/>
-    <p:sldId id="407" r:id="rId30"/>
-    <p:sldId id="406" r:id="rId31"/>
-    <p:sldId id="403" r:id="rId32"/>
+    <p:sldId id="521" r:id="rId24"/>
+    <p:sldId id="522" r:id="rId25"/>
+    <p:sldId id="396" r:id="rId26"/>
+    <p:sldId id="397" r:id="rId27"/>
+    <p:sldId id="454" r:id="rId28"/>
+    <p:sldId id="398" r:id="rId29"/>
+    <p:sldId id="399" r:id="rId30"/>
+    <p:sldId id="404" r:id="rId31"/>
+    <p:sldId id="407" r:id="rId32"/>
+    <p:sldId id="406" r:id="rId33"/>
+    <p:sldId id="403" r:id="rId34"/>
   </p:sldIdLst>
   <p:sldSz cx="9144000" cy="5143500" type="screen16x9"/>
   <p:notesSz cx="6858000" cy="9144000"/>
@@ -1584,6 +1586,162 @@
 </file>
 
 <file path=ppt/notesSlides/notesSlide22.xml><?xml version="1.0" encoding="utf-8"?>
+<p:notes xmlns:a="http://schemas.openxmlformats.org/drawingml/2006/main" xmlns:r="http://schemas.openxmlformats.org/officeDocument/2006/relationships" xmlns:p="http://schemas.openxmlformats.org/presentationml/2006/main">
+  <p:cSld>
+    <p:spTree>
+      <p:nvGrpSpPr>
+        <p:cNvPr id="1" name=""/>
+        <p:cNvGrpSpPr/>
+        <p:nvPr/>
+      </p:nvGrpSpPr>
+      <p:grpSpPr>
+        <a:xfrm>
+          <a:off x="0" y="0"/>
+          <a:ext cx="0" cy="0"/>
+          <a:chOff x="0" y="0"/>
+          <a:chExt cx="0" cy="0"/>
+        </a:xfrm>
+      </p:grpSpPr>
+      <p:sp>
+        <p:nvSpPr>
+          <p:cNvPr id="2" name="幻灯片图像占位符 1"/>
+          <p:cNvSpPr>
+            <a:spLocks noGrp="true" noRot="true" noChangeAspect="true"/>
+          </p:cNvSpPr>
+          <p:nvPr>
+            <p:ph type="sldImg"/>
+          </p:nvPr>
+        </p:nvSpPr>
+        <p:spPr/>
+      </p:sp>
+      <p:sp>
+        <p:nvSpPr>
+          <p:cNvPr id="3" name="备注占位符 2"/>
+          <p:cNvSpPr>
+            <a:spLocks noGrp="true"/>
+          </p:cNvSpPr>
+          <p:nvPr>
+            <p:ph type="body" idx="1"/>
+          </p:nvPr>
+        </p:nvSpPr>
+        <p:spPr/>
+        <p:txBody>
+          <a:bodyPr/>
+          <a:lstStyle/>
+          <a:p>
+            <a:endParaRPr lang="zh-CN" altLang="en-US"/>
+          </a:p>
+        </p:txBody>
+      </p:sp>
+      <p:sp>
+        <p:nvSpPr>
+          <p:cNvPr id="4" name="灯片编号占位符 3"/>
+          <p:cNvSpPr>
+            <a:spLocks noGrp="true"/>
+          </p:cNvSpPr>
+          <p:nvPr>
+            <p:ph type="sldNum" sz="quarter" idx="10"/>
+          </p:nvPr>
+        </p:nvSpPr>
+        <p:spPr/>
+        <p:txBody>
+          <a:bodyPr/>
+          <a:lstStyle/>
+          <a:p>
+            <a:fld id="{74E7DC6A-F9F9-48DB-9FE7-E174AE05389F}" type="slidenum">
+              <a:rPr lang="zh-CN" altLang="en-US" smtClean="0"/>
+            </a:fld>
+            <a:endParaRPr lang="zh-CN" altLang="en-US"/>
+          </a:p>
+        </p:txBody>
+      </p:sp>
+    </p:spTree>
+  </p:cSld>
+  <p:clrMapOvr>
+    <a:masterClrMapping/>
+  </p:clrMapOvr>
+</p:notes>
+</file>
+
+<file path=ppt/notesSlides/notesSlide23.xml><?xml version="1.0" encoding="utf-8"?>
+<p:notes xmlns:a="http://schemas.openxmlformats.org/drawingml/2006/main" xmlns:r="http://schemas.openxmlformats.org/officeDocument/2006/relationships" xmlns:p="http://schemas.openxmlformats.org/presentationml/2006/main">
+  <p:cSld>
+    <p:spTree>
+      <p:nvGrpSpPr>
+        <p:cNvPr id="1" name=""/>
+        <p:cNvGrpSpPr/>
+        <p:nvPr/>
+      </p:nvGrpSpPr>
+      <p:grpSpPr>
+        <a:xfrm>
+          <a:off x="0" y="0"/>
+          <a:ext cx="0" cy="0"/>
+          <a:chOff x="0" y="0"/>
+          <a:chExt cx="0" cy="0"/>
+        </a:xfrm>
+      </p:grpSpPr>
+      <p:sp>
+        <p:nvSpPr>
+          <p:cNvPr id="2" name="幻灯片图像占位符 1"/>
+          <p:cNvSpPr>
+            <a:spLocks noGrp="true" noRot="true" noChangeAspect="true"/>
+          </p:cNvSpPr>
+          <p:nvPr>
+            <p:ph type="sldImg"/>
+          </p:nvPr>
+        </p:nvSpPr>
+        <p:spPr/>
+      </p:sp>
+      <p:sp>
+        <p:nvSpPr>
+          <p:cNvPr id="3" name="备注占位符 2"/>
+          <p:cNvSpPr>
+            <a:spLocks noGrp="true"/>
+          </p:cNvSpPr>
+          <p:nvPr>
+            <p:ph type="body" idx="1"/>
+          </p:nvPr>
+        </p:nvSpPr>
+        <p:spPr/>
+        <p:txBody>
+          <a:bodyPr/>
+          <a:lstStyle/>
+          <a:p>
+            <a:endParaRPr lang="zh-CN" altLang="en-US"/>
+          </a:p>
+        </p:txBody>
+      </p:sp>
+      <p:sp>
+        <p:nvSpPr>
+          <p:cNvPr id="4" name="灯片编号占位符 3"/>
+          <p:cNvSpPr>
+            <a:spLocks noGrp="true"/>
+          </p:cNvSpPr>
+          <p:nvPr>
+            <p:ph type="sldNum" sz="quarter" idx="10"/>
+          </p:nvPr>
+        </p:nvSpPr>
+        <p:spPr/>
+        <p:txBody>
+          <a:bodyPr/>
+          <a:lstStyle/>
+          <a:p>
+            <a:fld id="{74E7DC6A-F9F9-48DB-9FE7-E174AE05389F}" type="slidenum">
+              <a:rPr lang="zh-CN" altLang="en-US" smtClean="0"/>
+            </a:fld>
+            <a:endParaRPr lang="zh-CN" altLang="en-US"/>
+          </a:p>
+        </p:txBody>
+      </p:sp>
+    </p:spTree>
+  </p:cSld>
+  <p:clrMapOvr>
+    <a:masterClrMapping/>
+  </p:clrMapOvr>
+</p:notes>
+</file>
+
+<file path=ppt/notesSlides/notesSlide24.xml><?xml version="1.0" encoding="utf-8"?>
 <p:notes xmlns:a="http://schemas.openxmlformats.org/drawingml/2006/main" xmlns:r="http://schemas.openxmlformats.org/officeDocument/2006/relationships" xmlns:p="http://schemas.openxmlformats.org/presentationml/2006/main">
   <p:cSld>
     <p:spTree>
@@ -14509,14 +14667,14 @@
               <a:t>共有</a:t>
             </a:r>
             <a:r>
-              <a:rPr lang="" altLang="zh-CN"/>
+              <a:rPr lang="en-US" altLang="zh-CN"/>
               <a:t>152241</a:t>
             </a:r>
             <a:r>
-              <a:rPr lang="zh-CN" altLang=""/>
+              <a:rPr lang="zh-CN" altLang="en-US"/>
               <a:t>个样本</a:t>
             </a:r>
-            <a:endParaRPr lang="zh-CN" altLang=""/>
+            <a:endParaRPr lang="zh-CN" altLang="en-US"/>
           </a:p>
         </p:txBody>
       </p:sp>
@@ -14729,7 +14887,6 @@
           <a:p>
             <a:r>
               <a:rPr lang="zh-CN" altLang="en-US">
-                <a:ln/>
                 <a:solidFill>
                   <a:schemeClr val="tx1"/>
                 </a:solidFill>
@@ -16802,7 +16959,7 @@
         <p:spPr>
           <a:xfrm>
             <a:off x="5944870" y="2266950"/>
-            <a:ext cx="2477770" cy="299085"/>
+            <a:ext cx="2477770" cy="506730"/>
           </a:xfrm>
           <a:prstGeom prst="rect">
             <a:avLst/>
@@ -16816,7 +16973,7 @@
           <a:p>
             <a:r>
               <a:rPr lang="zh-CN" altLang="en-US"/>
-              <a:t>删除答案所在的句子</a:t>
+              <a:t>删除答案所在的句子（构造一个负样本）</a:t>
             </a:r>
             <a:endParaRPr lang="zh-CN" altLang="en-US"/>
           </a:p>
@@ -17593,7 +17750,7 @@
         <p:spPr>
           <a:xfrm>
             <a:off x="900430" y="4240530"/>
-            <a:ext cx="2981325" cy="299085"/>
+            <a:ext cx="2981325" cy="506730"/>
           </a:xfrm>
           <a:prstGeom prst="rect">
             <a:avLst/>
@@ -17607,9 +17764,17 @@
           <a:p>
             <a:r>
               <a:rPr lang="zh-CN" altLang="en-US"/>
-              <a:t>随机选取句子替换掉答案所在的句子</a:t>
-            </a:r>
-            <a:endParaRPr lang="zh-CN" altLang="en-US"/>
+              <a:t>随机选取句子替换掉答案所在的句子，构造</a:t>
+            </a:r>
+            <a:r>
+              <a:rPr lang="" altLang="zh-CN"/>
+              <a:t>3</a:t>
+            </a:r>
+            <a:r>
+              <a:rPr lang="zh-CN" altLang=""/>
+              <a:t>个负样本</a:t>
+            </a:r>
+            <a:endParaRPr lang="zh-CN" altLang=""/>
           </a:p>
         </p:txBody>
       </p:sp>
@@ -17622,7 +17787,7 @@
         <p:spPr>
           <a:xfrm>
             <a:off x="5760720" y="4240530"/>
-            <a:ext cx="2981325" cy="299085"/>
+            <a:ext cx="2981325" cy="506730"/>
           </a:xfrm>
           <a:prstGeom prst="rect">
             <a:avLst/>
@@ -17636,7 +17801,14 @@
           <a:p>
             <a:r>
               <a:rPr lang="zh-CN" altLang="en-US"/>
-              <a:t>随机选取一篇文章替换原来的文章</a:t>
+              <a:t>随机选取一篇文章替换原来的文章，</a:t>
+            </a:r>
+            <a:endParaRPr lang="zh-CN" altLang="en-US"/>
+          </a:p>
+          <a:p>
+            <a:r>
+              <a:rPr lang="zh-CN" altLang="en-US"/>
+              <a:t>构造一个负样本</a:t>
             </a:r>
             <a:endParaRPr lang="zh-CN" altLang="en-US"/>
           </a:p>
@@ -17723,6 +17895,1642 @@
       </p:pic>
       <p:sp>
         <p:nvSpPr>
+          <p:cNvPr id="3" name="Text Box 2"/>
+          <p:cNvSpPr txBox="true"/>
+          <p:nvPr/>
+        </p:nvSpPr>
+        <p:spPr>
+          <a:xfrm>
+            <a:off x="508635" y="194310"/>
+            <a:ext cx="2943225" cy="583565"/>
+          </a:xfrm>
+          <a:prstGeom prst="rect">
+            <a:avLst/>
+          </a:prstGeom>
+          <a:noFill/>
+        </p:spPr>
+        <p:txBody>
+          <a:bodyPr wrap="square" rtlCol="0">
+            <a:spAutoFit/>
+          </a:bodyPr>
+          <a:p>
+            <a:r>
+              <a:rPr lang="zh-CN" altLang="en-US" sz="3200">
+                <a:ln w="12700">
+                  <a:solidFill>
+                    <a:schemeClr val="tx2">
+                      <a:lumMod val="75000"/>
+                    </a:schemeClr>
+                  </a:solidFill>
+                  <a:prstDash val="solid"/>
+                </a:ln>
+                <a:pattFill prst="dkUpDiag">
+                  <a:fgClr>
+                    <a:schemeClr val="tx2"/>
+                  </a:fgClr>
+                  <a:bgClr>
+                    <a:schemeClr val="tx2">
+                      <a:lumMod val="20000"/>
+                      <a:lumOff val="80000"/>
+                    </a:schemeClr>
+                  </a:bgClr>
+                </a:pattFill>
+                <a:effectLst>
+                  <a:outerShdw dist="38100" dir="2640000" algn="bl" rotWithShape="0">
+                    <a:schemeClr val="tx2">
+                      <a:lumMod val="75000"/>
+                    </a:schemeClr>
+                  </a:outerShdw>
+                </a:effectLst>
+              </a:rPr>
+              <a:t>已完成进度</a:t>
+            </a:r>
+            <a:endParaRPr lang="zh-CN" altLang="en-US" sz="3200">
+              <a:ln w="12700">
+                <a:solidFill>
+                  <a:schemeClr val="tx2">
+                    <a:lumMod val="75000"/>
+                  </a:schemeClr>
+                </a:solidFill>
+                <a:prstDash val="solid"/>
+              </a:ln>
+              <a:pattFill prst="dkUpDiag">
+                <a:fgClr>
+                  <a:schemeClr val="tx2"/>
+                </a:fgClr>
+                <a:bgClr>
+                  <a:schemeClr val="tx2">
+                    <a:lumMod val="20000"/>
+                    <a:lumOff val="80000"/>
+                  </a:schemeClr>
+                </a:bgClr>
+              </a:pattFill>
+              <a:effectLst>
+                <a:outerShdw dist="38100" dir="2640000" algn="bl" rotWithShape="0">
+                  <a:schemeClr val="tx2">
+                    <a:lumMod val="75000"/>
+                  </a:schemeClr>
+                </a:outerShdw>
+              </a:effectLst>
+            </a:endParaRPr>
+          </a:p>
+        </p:txBody>
+      </p:sp>
+      <p:sp>
+        <p:nvSpPr>
+          <p:cNvPr id="6" name="Text Box 5"/>
+          <p:cNvSpPr txBox="true"/>
+          <p:nvPr/>
+        </p:nvSpPr>
+        <p:spPr>
+          <a:xfrm>
+            <a:off x="5195570" y="4758690"/>
+            <a:ext cx="3811270" cy="299085"/>
+          </a:xfrm>
+          <a:prstGeom prst="rect">
+            <a:avLst/>
+          </a:prstGeom>
+          <a:noFill/>
+        </p:spPr>
+        <p:txBody>
+          <a:bodyPr wrap="square" rtlCol="0">
+            <a:spAutoFit/>
+          </a:bodyPr>
+          <a:p>
+            <a:r>
+              <a:rPr lang="zh-CN" altLang="en-US" b="1">
+                <a:sym typeface="+mn-ea"/>
+              </a:rPr>
+              <a:t>基于阅读理解形式的中文问答系统研究与实现</a:t>
+            </a:r>
+            <a:endParaRPr lang="en-US"/>
+          </a:p>
+        </p:txBody>
+      </p:sp>
+      <p:sp>
+        <p:nvSpPr>
+          <p:cNvPr id="8" name="圆角矩形 8"/>
+          <p:cNvSpPr>
+            <a:spLocks noChangeArrowheads="true"/>
+          </p:cNvSpPr>
+          <p:nvPr/>
+        </p:nvSpPr>
+        <p:spPr bwMode="auto">
+          <a:xfrm>
+            <a:off x="261620" y="889635"/>
+            <a:ext cx="4320540" cy="1377315"/>
+          </a:xfrm>
+          <a:prstGeom prst="roundRect">
+            <a:avLst>
+              <a:gd name="adj" fmla="val 4324"/>
+            </a:avLst>
+          </a:prstGeom>
+          <a:solidFill>
+            <a:srgbClr val="F2F2F2"/>
+          </a:solidFill>
+          <a:ln w="9525">
+            <a:solidFill>
+              <a:schemeClr val="tx1"/>
+            </a:solidFill>
+            <a:round/>
+          </a:ln>
+        </p:spPr>
+        <p:txBody>
+          <a:bodyPr/>
+          <a:lstStyle>
+            <a:lvl1pPr eaLnBrk="0" hangingPunct="0">
+              <a:defRPr>
+                <a:solidFill>
+                  <a:schemeClr val="tx1"/>
+                </a:solidFill>
+                <a:latin typeface="Arial" panose="02080604020202020204" pitchFamily="34" charset="0"/>
+                <a:ea typeface="宋体" pitchFamily="2" charset="-122"/>
+              </a:defRPr>
+            </a:lvl1pPr>
+            <a:lvl2pPr eaLnBrk="0" hangingPunct="0">
+              <a:defRPr>
+                <a:solidFill>
+                  <a:schemeClr val="tx1"/>
+                </a:solidFill>
+                <a:latin typeface="Arial" panose="02080604020202020204" pitchFamily="34" charset="0"/>
+                <a:ea typeface="宋体" pitchFamily="2" charset="-122"/>
+              </a:defRPr>
+            </a:lvl2pPr>
+            <a:lvl3pPr eaLnBrk="0" hangingPunct="0">
+              <a:defRPr>
+                <a:solidFill>
+                  <a:schemeClr val="tx1"/>
+                </a:solidFill>
+                <a:latin typeface="Arial" panose="02080604020202020204" pitchFamily="34" charset="0"/>
+                <a:ea typeface="宋体" pitchFamily="2" charset="-122"/>
+              </a:defRPr>
+            </a:lvl3pPr>
+            <a:lvl4pPr eaLnBrk="0" hangingPunct="0">
+              <a:defRPr>
+                <a:solidFill>
+                  <a:schemeClr val="tx1"/>
+                </a:solidFill>
+                <a:latin typeface="Arial" panose="02080604020202020204" pitchFamily="34" charset="0"/>
+                <a:ea typeface="宋体" pitchFamily="2" charset="-122"/>
+              </a:defRPr>
+            </a:lvl4pPr>
+            <a:lvl5pPr eaLnBrk="0" hangingPunct="0">
+              <a:defRPr>
+                <a:solidFill>
+                  <a:schemeClr val="tx1"/>
+                </a:solidFill>
+                <a:latin typeface="Arial" panose="02080604020202020204" pitchFamily="34" charset="0"/>
+                <a:ea typeface="宋体" pitchFamily="2" charset="-122"/>
+              </a:defRPr>
+            </a:lvl5pPr>
+            <a:lvl6pPr eaLnBrk="0" fontAlgn="base" hangingPunct="0">
+              <a:spcBef>
+                <a:spcPct val="0"/>
+              </a:spcBef>
+              <a:spcAft>
+                <a:spcPct val="0"/>
+              </a:spcAft>
+              <a:buFont typeface="Arial" panose="02080604020202020204" pitchFamily="34" charset="0"/>
+              <a:defRPr>
+                <a:solidFill>
+                  <a:schemeClr val="tx1"/>
+                </a:solidFill>
+                <a:latin typeface="Arial" panose="02080604020202020204" pitchFamily="34" charset="0"/>
+                <a:ea typeface="宋体" pitchFamily="2" charset="-122"/>
+              </a:defRPr>
+            </a:lvl6pPr>
+            <a:lvl7pPr eaLnBrk="0" fontAlgn="base" hangingPunct="0">
+              <a:spcBef>
+                <a:spcPct val="0"/>
+              </a:spcBef>
+              <a:spcAft>
+                <a:spcPct val="0"/>
+              </a:spcAft>
+              <a:buFont typeface="Arial" panose="02080604020202020204" pitchFamily="34" charset="0"/>
+              <a:defRPr>
+                <a:solidFill>
+                  <a:schemeClr val="tx1"/>
+                </a:solidFill>
+                <a:latin typeface="Arial" panose="02080604020202020204" pitchFamily="34" charset="0"/>
+                <a:ea typeface="宋体" pitchFamily="2" charset="-122"/>
+              </a:defRPr>
+            </a:lvl7pPr>
+            <a:lvl8pPr eaLnBrk="0" fontAlgn="base" hangingPunct="0">
+              <a:spcBef>
+                <a:spcPct val="0"/>
+              </a:spcBef>
+              <a:spcAft>
+                <a:spcPct val="0"/>
+              </a:spcAft>
+              <a:buFont typeface="Arial" panose="02080604020202020204" pitchFamily="34" charset="0"/>
+              <a:defRPr>
+                <a:solidFill>
+                  <a:schemeClr val="tx1"/>
+                </a:solidFill>
+                <a:latin typeface="Arial" panose="02080604020202020204" pitchFamily="34" charset="0"/>
+                <a:ea typeface="宋体" pitchFamily="2" charset="-122"/>
+              </a:defRPr>
+            </a:lvl8pPr>
+            <a:lvl9pPr eaLnBrk="0" fontAlgn="base" hangingPunct="0">
+              <a:spcBef>
+                <a:spcPct val="0"/>
+              </a:spcBef>
+              <a:spcAft>
+                <a:spcPct val="0"/>
+              </a:spcAft>
+              <a:buFont typeface="Arial" panose="02080604020202020204" pitchFamily="34" charset="0"/>
+              <a:defRPr>
+                <a:solidFill>
+                  <a:schemeClr val="tx1"/>
+                </a:solidFill>
+                <a:latin typeface="Arial" panose="02080604020202020204" pitchFamily="34" charset="0"/>
+                <a:ea typeface="宋体" pitchFamily="2" charset="-122"/>
+              </a:defRPr>
+            </a:lvl9pPr>
+          </a:lstStyle>
+          <a:p>
+            <a:pPr eaLnBrk="1" hangingPunct="1"/>
+            <a:endParaRPr lang="zh-CN" altLang="en-US" sz="1350">
+              <a:solidFill>
+                <a:srgbClr val="C4261D"/>
+              </a:solidFill>
+            </a:endParaRPr>
+          </a:p>
+        </p:txBody>
+      </p:sp>
+      <p:cxnSp>
+        <p:nvCxnSpPr>
+          <p:cNvPr id="9" name="Straight Connector 8"/>
+          <p:cNvCxnSpPr/>
+          <p:nvPr/>
+        </p:nvCxnSpPr>
+        <p:spPr>
+          <a:xfrm>
+            <a:off x="261620" y="2037080"/>
+            <a:ext cx="4236720" cy="8255"/>
+          </a:xfrm>
+          <a:prstGeom prst="line">
+            <a:avLst/>
+          </a:prstGeom>
+          <a:ln w="19050">
+            <a:solidFill>
+              <a:schemeClr val="tx1"/>
+            </a:solidFill>
+          </a:ln>
+        </p:spPr>
+        <p:style>
+          <a:lnRef idx="1">
+            <a:schemeClr val="accent1"/>
+          </a:lnRef>
+          <a:fillRef idx="0">
+            <a:schemeClr val="accent1"/>
+          </a:fillRef>
+          <a:effectRef idx="0">
+            <a:schemeClr val="accent1"/>
+          </a:effectRef>
+          <a:fontRef idx="minor">
+            <a:schemeClr val="tx1"/>
+          </a:fontRef>
+        </p:style>
+      </p:cxnSp>
+      <p:sp>
+        <p:nvSpPr>
+          <p:cNvPr id="10" name="Text Box 9"/>
+          <p:cNvSpPr txBox="true"/>
+          <p:nvPr/>
+        </p:nvSpPr>
+        <p:spPr>
+          <a:xfrm>
+            <a:off x="280670" y="1028065"/>
+            <a:ext cx="4404360" cy="922020"/>
+          </a:xfrm>
+          <a:prstGeom prst="rect">
+            <a:avLst/>
+          </a:prstGeom>
+          <a:noFill/>
+        </p:spPr>
+        <p:txBody>
+          <a:bodyPr wrap="square" rtlCol="0">
+            <a:spAutoFit/>
+          </a:bodyPr>
+          <a:p>
+            <a:r>
+              <a:rPr lang="zh-CN" altLang="en-US" sz="900"/>
+              <a:t>文本段落：华阳路街道是中国上海市长宁区下辖的一个街道办事处，位于长宁区东部，</a:t>
+            </a:r>
+            <a:r>
+              <a:rPr lang="zh-CN" altLang="en-US" sz="900">
+                <a:solidFill>
+                  <a:srgbClr val="D43C2C"/>
+                </a:solidFill>
+                <a:uFillTx/>
+              </a:rPr>
+              <a:t>东到长宁路、安西路、武夷路接邻江苏路街道，北到苏州河接邻普陀区</a:t>
+            </a:r>
+            <a:r>
+              <a:rPr lang="zh-CN" altLang="en-US" sz="900"/>
+              <a:t>。面积2.04平方公里，户籍人口7.04万人（2008年），下辖21个居委会。华阳路街道的主要街道长宁路和定西路，构成繁华的中山公园商圈。辖区内的圣约翰大学旧址（今华东政法大学）、中山公园，是愚园路历史文化风貌区的重要组成部分。上海市轨道交通二号线、三号线、四号线以该街道辖区的中山公园站为换乘枢纽。</a:t>
+            </a:r>
+            <a:endParaRPr lang="zh-CN" altLang="en-US" sz="900"/>
+          </a:p>
+        </p:txBody>
+      </p:sp>
+      <p:sp>
+        <p:nvSpPr>
+          <p:cNvPr id="11" name="Text Box 10"/>
+          <p:cNvSpPr txBox="true"/>
+          <p:nvPr/>
+        </p:nvSpPr>
+        <p:spPr>
+          <a:xfrm>
+            <a:off x="261620" y="2037080"/>
+            <a:ext cx="4057015" cy="229870"/>
+          </a:xfrm>
+          <a:prstGeom prst="rect">
+            <a:avLst/>
+          </a:prstGeom>
+          <a:noFill/>
+        </p:spPr>
+        <p:txBody>
+          <a:bodyPr wrap="square" rtlCol="0">
+            <a:spAutoFit/>
+          </a:bodyPr>
+          <a:p>
+            <a:r>
+              <a:rPr lang="zh-CN" altLang="en-US" sz="900">
+                <a:solidFill>
+                  <a:schemeClr val="tx1"/>
+                </a:solidFill>
+                <a:uFillTx/>
+              </a:rPr>
+              <a:t>问题：华阳路街道四周相连的是什么地方？</a:t>
+            </a:r>
+            <a:endParaRPr lang="zh-CN" altLang="en-US" sz="900">
+              <a:solidFill>
+                <a:schemeClr val="tx1"/>
+              </a:solidFill>
+              <a:uFillTx/>
+            </a:endParaRPr>
+          </a:p>
+        </p:txBody>
+      </p:sp>
+      <p:sp>
+        <p:nvSpPr>
+          <p:cNvPr id="18" name="Text Box 17"/>
+          <p:cNvSpPr txBox="true"/>
+          <p:nvPr/>
+        </p:nvSpPr>
+        <p:spPr>
+          <a:xfrm>
+            <a:off x="1488440" y="2266950"/>
+            <a:ext cx="1454785" cy="299085"/>
+          </a:xfrm>
+          <a:prstGeom prst="rect">
+            <a:avLst/>
+          </a:prstGeom>
+          <a:noFill/>
+        </p:spPr>
+        <p:txBody>
+          <a:bodyPr wrap="square" rtlCol="0">
+            <a:spAutoFit/>
+          </a:bodyPr>
+          <a:p>
+            <a:r>
+              <a:rPr lang="zh-CN" altLang="en-US"/>
+              <a:t>正样本</a:t>
+            </a:r>
+            <a:endParaRPr lang="zh-CN" altLang="en-US"/>
+          </a:p>
+        </p:txBody>
+      </p:sp>
+      <p:sp>
+        <p:nvSpPr>
+          <p:cNvPr id="4" name="圆角矩形 8"/>
+          <p:cNvSpPr>
+            <a:spLocks noChangeArrowheads="true"/>
+          </p:cNvSpPr>
+          <p:nvPr/>
+        </p:nvSpPr>
+        <p:spPr bwMode="auto">
+          <a:xfrm>
+            <a:off x="4754880" y="889635"/>
+            <a:ext cx="4219575" cy="1377315"/>
+          </a:xfrm>
+          <a:prstGeom prst="roundRect">
+            <a:avLst>
+              <a:gd name="adj" fmla="val 4324"/>
+            </a:avLst>
+          </a:prstGeom>
+          <a:solidFill>
+            <a:srgbClr val="F2F2F2"/>
+          </a:solidFill>
+          <a:ln w="9525">
+            <a:solidFill>
+              <a:schemeClr val="tx1"/>
+            </a:solidFill>
+            <a:round/>
+          </a:ln>
+        </p:spPr>
+        <p:txBody>
+          <a:bodyPr/>
+          <a:lstStyle>
+            <a:lvl1pPr eaLnBrk="0" hangingPunct="0">
+              <a:defRPr>
+                <a:solidFill>
+                  <a:schemeClr val="tx1"/>
+                </a:solidFill>
+                <a:latin typeface="Arial" panose="02080604020202020204" pitchFamily="34" charset="0"/>
+                <a:ea typeface="宋体" pitchFamily="2" charset="-122"/>
+              </a:defRPr>
+            </a:lvl1pPr>
+            <a:lvl2pPr eaLnBrk="0" hangingPunct="0">
+              <a:defRPr>
+                <a:solidFill>
+                  <a:schemeClr val="tx1"/>
+                </a:solidFill>
+                <a:latin typeface="Arial" panose="02080604020202020204" pitchFamily="34" charset="0"/>
+                <a:ea typeface="宋体" pitchFamily="2" charset="-122"/>
+              </a:defRPr>
+            </a:lvl2pPr>
+            <a:lvl3pPr eaLnBrk="0" hangingPunct="0">
+              <a:defRPr>
+                <a:solidFill>
+                  <a:schemeClr val="tx1"/>
+                </a:solidFill>
+                <a:latin typeface="Arial" panose="02080604020202020204" pitchFamily="34" charset="0"/>
+                <a:ea typeface="宋体" pitchFamily="2" charset="-122"/>
+              </a:defRPr>
+            </a:lvl3pPr>
+            <a:lvl4pPr eaLnBrk="0" hangingPunct="0">
+              <a:defRPr>
+                <a:solidFill>
+                  <a:schemeClr val="tx1"/>
+                </a:solidFill>
+                <a:latin typeface="Arial" panose="02080604020202020204" pitchFamily="34" charset="0"/>
+                <a:ea typeface="宋体" pitchFamily="2" charset="-122"/>
+              </a:defRPr>
+            </a:lvl4pPr>
+            <a:lvl5pPr eaLnBrk="0" hangingPunct="0">
+              <a:defRPr>
+                <a:solidFill>
+                  <a:schemeClr val="tx1"/>
+                </a:solidFill>
+                <a:latin typeface="Arial" panose="02080604020202020204" pitchFamily="34" charset="0"/>
+                <a:ea typeface="宋体" pitchFamily="2" charset="-122"/>
+              </a:defRPr>
+            </a:lvl5pPr>
+            <a:lvl6pPr eaLnBrk="0" fontAlgn="base" hangingPunct="0">
+              <a:spcBef>
+                <a:spcPct val="0"/>
+              </a:spcBef>
+              <a:spcAft>
+                <a:spcPct val="0"/>
+              </a:spcAft>
+              <a:buFont typeface="Arial" panose="02080604020202020204" pitchFamily="34" charset="0"/>
+              <a:defRPr>
+                <a:solidFill>
+                  <a:schemeClr val="tx1"/>
+                </a:solidFill>
+                <a:latin typeface="Arial" panose="02080604020202020204" pitchFamily="34" charset="0"/>
+                <a:ea typeface="宋体" pitchFamily="2" charset="-122"/>
+              </a:defRPr>
+            </a:lvl6pPr>
+            <a:lvl7pPr eaLnBrk="0" fontAlgn="base" hangingPunct="0">
+              <a:spcBef>
+                <a:spcPct val="0"/>
+              </a:spcBef>
+              <a:spcAft>
+                <a:spcPct val="0"/>
+              </a:spcAft>
+              <a:buFont typeface="Arial" panose="02080604020202020204" pitchFamily="34" charset="0"/>
+              <a:defRPr>
+                <a:solidFill>
+                  <a:schemeClr val="tx1"/>
+                </a:solidFill>
+                <a:latin typeface="Arial" panose="02080604020202020204" pitchFamily="34" charset="0"/>
+                <a:ea typeface="宋体" pitchFamily="2" charset="-122"/>
+              </a:defRPr>
+            </a:lvl7pPr>
+            <a:lvl8pPr eaLnBrk="0" fontAlgn="base" hangingPunct="0">
+              <a:spcBef>
+                <a:spcPct val="0"/>
+              </a:spcBef>
+              <a:spcAft>
+                <a:spcPct val="0"/>
+              </a:spcAft>
+              <a:buFont typeface="Arial" panose="02080604020202020204" pitchFamily="34" charset="0"/>
+              <a:defRPr>
+                <a:solidFill>
+                  <a:schemeClr val="tx1"/>
+                </a:solidFill>
+                <a:latin typeface="Arial" panose="02080604020202020204" pitchFamily="34" charset="0"/>
+                <a:ea typeface="宋体" pitchFamily="2" charset="-122"/>
+              </a:defRPr>
+            </a:lvl8pPr>
+            <a:lvl9pPr eaLnBrk="0" fontAlgn="base" hangingPunct="0">
+              <a:spcBef>
+                <a:spcPct val="0"/>
+              </a:spcBef>
+              <a:spcAft>
+                <a:spcPct val="0"/>
+              </a:spcAft>
+              <a:buFont typeface="Arial" panose="02080604020202020204" pitchFamily="34" charset="0"/>
+              <a:defRPr>
+                <a:solidFill>
+                  <a:schemeClr val="tx1"/>
+                </a:solidFill>
+                <a:latin typeface="Arial" panose="02080604020202020204" pitchFamily="34" charset="0"/>
+                <a:ea typeface="宋体" pitchFamily="2" charset="-122"/>
+              </a:defRPr>
+            </a:lvl9pPr>
+          </a:lstStyle>
+          <a:p>
+            <a:pPr eaLnBrk="1" hangingPunct="1"/>
+            <a:endParaRPr lang="zh-CN" altLang="en-US" sz="1350">
+              <a:solidFill>
+                <a:srgbClr val="C4261D"/>
+              </a:solidFill>
+            </a:endParaRPr>
+          </a:p>
+        </p:txBody>
+      </p:sp>
+      <p:cxnSp>
+        <p:nvCxnSpPr>
+          <p:cNvPr id="5" name="Straight Connector 4"/>
+          <p:cNvCxnSpPr/>
+          <p:nvPr/>
+        </p:nvCxnSpPr>
+        <p:spPr>
+          <a:xfrm>
+            <a:off x="4754880" y="2037080"/>
+            <a:ext cx="4136390" cy="6985"/>
+          </a:xfrm>
+          <a:prstGeom prst="line">
+            <a:avLst/>
+          </a:prstGeom>
+          <a:ln w="19050">
+            <a:solidFill>
+              <a:schemeClr val="tx1"/>
+            </a:solidFill>
+          </a:ln>
+        </p:spPr>
+        <p:style>
+          <a:lnRef idx="1">
+            <a:schemeClr val="accent1"/>
+          </a:lnRef>
+          <a:fillRef idx="0">
+            <a:schemeClr val="accent1"/>
+          </a:fillRef>
+          <a:effectRef idx="0">
+            <a:schemeClr val="accent1"/>
+          </a:effectRef>
+          <a:fontRef idx="minor">
+            <a:schemeClr val="tx1"/>
+          </a:fontRef>
+        </p:style>
+      </p:cxnSp>
+      <p:sp>
+        <p:nvSpPr>
+          <p:cNvPr id="7" name="Text Box 6"/>
+          <p:cNvSpPr txBox="true"/>
+          <p:nvPr/>
+        </p:nvSpPr>
+        <p:spPr>
+          <a:xfrm>
+            <a:off x="4773930" y="1028065"/>
+            <a:ext cx="4300855" cy="506730"/>
+          </a:xfrm>
+          <a:prstGeom prst="rect">
+            <a:avLst/>
+          </a:prstGeom>
+          <a:noFill/>
+        </p:spPr>
+        <p:txBody>
+          <a:bodyPr wrap="square" rtlCol="0">
+            <a:spAutoFit/>
+          </a:bodyPr>
+          <a:p>
+            <a:r>
+              <a:rPr lang="zh-CN" altLang="en-US" sz="900"/>
+              <a:t>文本段落：华阳路街道是中国上海市长宁区下辖的一个街道办事处，位于长宁区东部，</a:t>
+            </a:r>
+            <a:r>
+              <a:rPr lang="zh-CN" altLang="en-US" sz="900">
+                <a:solidFill>
+                  <a:srgbClr val="D43C2C"/>
+                </a:solidFill>
+                <a:uFillTx/>
+              </a:rPr>
+              <a:t>东到长宁路、安西路、武夷路接邻江苏路街道，北到苏州河接邻普陀区</a:t>
+            </a:r>
+            <a:r>
+              <a:rPr lang="zh-CN" altLang="en-US" sz="900"/>
+              <a:t>。面积2.04平方公里，户籍人口7.04万人（2008年），下辖21个居委会。</a:t>
+            </a:r>
+            <a:endParaRPr lang="zh-CN" altLang="en-US" sz="900"/>
+          </a:p>
+        </p:txBody>
+      </p:sp>
+      <p:sp>
+        <p:nvSpPr>
+          <p:cNvPr id="12" name="Text Box 11"/>
+          <p:cNvSpPr txBox="true"/>
+          <p:nvPr/>
+        </p:nvSpPr>
+        <p:spPr>
+          <a:xfrm>
+            <a:off x="4754880" y="2037080"/>
+            <a:ext cx="3961765" cy="229870"/>
+          </a:xfrm>
+          <a:prstGeom prst="rect">
+            <a:avLst/>
+          </a:prstGeom>
+          <a:noFill/>
+        </p:spPr>
+        <p:txBody>
+          <a:bodyPr wrap="square" rtlCol="0">
+            <a:spAutoFit/>
+          </a:bodyPr>
+          <a:p>
+            <a:r>
+              <a:rPr lang="zh-CN" altLang="en-US" sz="900">
+                <a:solidFill>
+                  <a:schemeClr val="tx1"/>
+                </a:solidFill>
+                <a:uFillTx/>
+              </a:rPr>
+              <a:t>问题：华阳路街道四周相连的是什么地方？</a:t>
+            </a:r>
+            <a:endParaRPr lang="zh-CN" altLang="en-US" sz="900">
+              <a:solidFill>
+                <a:schemeClr val="tx1"/>
+              </a:solidFill>
+              <a:uFillTx/>
+            </a:endParaRPr>
+          </a:p>
+        </p:txBody>
+      </p:sp>
+      <p:sp>
+        <p:nvSpPr>
+          <p:cNvPr id="13" name="Text Box 12"/>
+          <p:cNvSpPr txBox="true"/>
+          <p:nvPr/>
+        </p:nvSpPr>
+        <p:spPr>
+          <a:xfrm>
+            <a:off x="5981700" y="2266950"/>
+            <a:ext cx="1421130" cy="299085"/>
+          </a:xfrm>
+          <a:prstGeom prst="rect">
+            <a:avLst/>
+          </a:prstGeom>
+          <a:noFill/>
+        </p:spPr>
+        <p:txBody>
+          <a:bodyPr wrap="square" rtlCol="0">
+            <a:spAutoFit/>
+          </a:bodyPr>
+          <a:p>
+            <a:r>
+              <a:rPr lang="zh-CN" altLang="en-US"/>
+              <a:t>正样本</a:t>
+            </a:r>
+            <a:endParaRPr lang="zh-CN" altLang="en-US"/>
+          </a:p>
+        </p:txBody>
+      </p:sp>
+      <p:sp>
+        <p:nvSpPr>
+          <p:cNvPr id="14" name="圆角矩形 8"/>
+          <p:cNvSpPr>
+            <a:spLocks noChangeArrowheads="true"/>
+          </p:cNvSpPr>
+          <p:nvPr/>
+        </p:nvSpPr>
+        <p:spPr bwMode="auto">
+          <a:xfrm>
+            <a:off x="261620" y="2815590"/>
+            <a:ext cx="4320540" cy="1377315"/>
+          </a:xfrm>
+          <a:prstGeom prst="roundRect">
+            <a:avLst>
+              <a:gd name="adj" fmla="val 4324"/>
+            </a:avLst>
+          </a:prstGeom>
+          <a:solidFill>
+            <a:srgbClr val="F2F2F2"/>
+          </a:solidFill>
+          <a:ln w="9525">
+            <a:solidFill>
+              <a:schemeClr val="tx1"/>
+            </a:solidFill>
+            <a:round/>
+          </a:ln>
+        </p:spPr>
+        <p:txBody>
+          <a:bodyPr/>
+          <a:lstStyle>
+            <a:lvl1pPr eaLnBrk="0" hangingPunct="0">
+              <a:defRPr>
+                <a:solidFill>
+                  <a:schemeClr val="tx1"/>
+                </a:solidFill>
+                <a:latin typeface="Arial" panose="02080604020202020204" pitchFamily="34" charset="0"/>
+                <a:ea typeface="宋体" pitchFamily="2" charset="-122"/>
+              </a:defRPr>
+            </a:lvl1pPr>
+            <a:lvl2pPr eaLnBrk="0" hangingPunct="0">
+              <a:defRPr>
+                <a:solidFill>
+                  <a:schemeClr val="tx1"/>
+                </a:solidFill>
+                <a:latin typeface="Arial" panose="02080604020202020204" pitchFamily="34" charset="0"/>
+                <a:ea typeface="宋体" pitchFamily="2" charset="-122"/>
+              </a:defRPr>
+            </a:lvl2pPr>
+            <a:lvl3pPr eaLnBrk="0" hangingPunct="0">
+              <a:defRPr>
+                <a:solidFill>
+                  <a:schemeClr val="tx1"/>
+                </a:solidFill>
+                <a:latin typeface="Arial" panose="02080604020202020204" pitchFamily="34" charset="0"/>
+                <a:ea typeface="宋体" pitchFamily="2" charset="-122"/>
+              </a:defRPr>
+            </a:lvl3pPr>
+            <a:lvl4pPr eaLnBrk="0" hangingPunct="0">
+              <a:defRPr>
+                <a:solidFill>
+                  <a:schemeClr val="tx1"/>
+                </a:solidFill>
+                <a:latin typeface="Arial" panose="02080604020202020204" pitchFamily="34" charset="0"/>
+                <a:ea typeface="宋体" pitchFamily="2" charset="-122"/>
+              </a:defRPr>
+            </a:lvl4pPr>
+            <a:lvl5pPr eaLnBrk="0" hangingPunct="0">
+              <a:defRPr>
+                <a:solidFill>
+                  <a:schemeClr val="tx1"/>
+                </a:solidFill>
+                <a:latin typeface="Arial" panose="02080604020202020204" pitchFamily="34" charset="0"/>
+                <a:ea typeface="宋体" pitchFamily="2" charset="-122"/>
+              </a:defRPr>
+            </a:lvl5pPr>
+            <a:lvl6pPr eaLnBrk="0" fontAlgn="base" hangingPunct="0">
+              <a:spcBef>
+                <a:spcPct val="0"/>
+              </a:spcBef>
+              <a:spcAft>
+                <a:spcPct val="0"/>
+              </a:spcAft>
+              <a:buFont typeface="Arial" panose="02080604020202020204" pitchFamily="34" charset="0"/>
+              <a:defRPr>
+                <a:solidFill>
+                  <a:schemeClr val="tx1"/>
+                </a:solidFill>
+                <a:latin typeface="Arial" panose="02080604020202020204" pitchFamily="34" charset="0"/>
+                <a:ea typeface="宋体" pitchFamily="2" charset="-122"/>
+              </a:defRPr>
+            </a:lvl6pPr>
+            <a:lvl7pPr eaLnBrk="0" fontAlgn="base" hangingPunct="0">
+              <a:spcBef>
+                <a:spcPct val="0"/>
+              </a:spcBef>
+              <a:spcAft>
+                <a:spcPct val="0"/>
+              </a:spcAft>
+              <a:buFont typeface="Arial" panose="02080604020202020204" pitchFamily="34" charset="0"/>
+              <a:defRPr>
+                <a:solidFill>
+                  <a:schemeClr val="tx1"/>
+                </a:solidFill>
+                <a:latin typeface="Arial" panose="02080604020202020204" pitchFamily="34" charset="0"/>
+                <a:ea typeface="宋体" pitchFamily="2" charset="-122"/>
+              </a:defRPr>
+            </a:lvl7pPr>
+            <a:lvl8pPr eaLnBrk="0" fontAlgn="base" hangingPunct="0">
+              <a:spcBef>
+                <a:spcPct val="0"/>
+              </a:spcBef>
+              <a:spcAft>
+                <a:spcPct val="0"/>
+              </a:spcAft>
+              <a:buFont typeface="Arial" panose="02080604020202020204" pitchFamily="34" charset="0"/>
+              <a:defRPr>
+                <a:solidFill>
+                  <a:schemeClr val="tx1"/>
+                </a:solidFill>
+                <a:latin typeface="Arial" panose="02080604020202020204" pitchFamily="34" charset="0"/>
+                <a:ea typeface="宋体" pitchFamily="2" charset="-122"/>
+              </a:defRPr>
+            </a:lvl8pPr>
+            <a:lvl9pPr eaLnBrk="0" fontAlgn="base" hangingPunct="0">
+              <a:spcBef>
+                <a:spcPct val="0"/>
+              </a:spcBef>
+              <a:spcAft>
+                <a:spcPct val="0"/>
+              </a:spcAft>
+              <a:buFont typeface="Arial" panose="02080604020202020204" pitchFamily="34" charset="0"/>
+              <a:defRPr>
+                <a:solidFill>
+                  <a:schemeClr val="tx1"/>
+                </a:solidFill>
+                <a:latin typeface="Arial" panose="02080604020202020204" pitchFamily="34" charset="0"/>
+                <a:ea typeface="宋体" pitchFamily="2" charset="-122"/>
+              </a:defRPr>
+            </a:lvl9pPr>
+          </a:lstStyle>
+          <a:p>
+            <a:pPr eaLnBrk="1" hangingPunct="1"/>
+            <a:endParaRPr lang="zh-CN" altLang="en-US" sz="1350">
+              <a:solidFill>
+                <a:srgbClr val="C4261D"/>
+              </a:solidFill>
+            </a:endParaRPr>
+          </a:p>
+        </p:txBody>
+      </p:sp>
+      <p:cxnSp>
+        <p:nvCxnSpPr>
+          <p:cNvPr id="15" name="Straight Connector 14"/>
+          <p:cNvCxnSpPr/>
+          <p:nvPr/>
+        </p:nvCxnSpPr>
+        <p:spPr>
+          <a:xfrm>
+            <a:off x="261620" y="3963035"/>
+            <a:ext cx="4236720" cy="8255"/>
+          </a:xfrm>
+          <a:prstGeom prst="line">
+            <a:avLst/>
+          </a:prstGeom>
+          <a:ln w="19050">
+            <a:solidFill>
+              <a:schemeClr val="tx1"/>
+            </a:solidFill>
+          </a:ln>
+        </p:spPr>
+        <p:style>
+          <a:lnRef idx="1">
+            <a:schemeClr val="accent1"/>
+          </a:lnRef>
+          <a:fillRef idx="0">
+            <a:schemeClr val="accent1"/>
+          </a:fillRef>
+          <a:effectRef idx="0">
+            <a:schemeClr val="accent1"/>
+          </a:effectRef>
+          <a:fontRef idx="minor">
+            <a:schemeClr val="tx1"/>
+          </a:fontRef>
+        </p:style>
+      </p:cxnSp>
+      <p:sp>
+        <p:nvSpPr>
+          <p:cNvPr id="16" name="Text Box 15"/>
+          <p:cNvSpPr txBox="true"/>
+          <p:nvPr/>
+        </p:nvSpPr>
+        <p:spPr>
+          <a:xfrm>
+            <a:off x="280670" y="2954020"/>
+            <a:ext cx="4404360" cy="783590"/>
+          </a:xfrm>
+          <a:prstGeom prst="rect">
+            <a:avLst/>
+          </a:prstGeom>
+          <a:noFill/>
+        </p:spPr>
+        <p:txBody>
+          <a:bodyPr wrap="square" rtlCol="0">
+            <a:spAutoFit/>
+          </a:bodyPr>
+          <a:p>
+            <a:r>
+              <a:rPr lang="zh-CN" altLang="en-US" sz="900"/>
+              <a:t>文本段落：华阳路街道是中国上海市长宁区下辖的一个街道办事处，位于长宁区东部，</a:t>
+            </a:r>
+            <a:r>
+              <a:rPr lang="zh-CN" altLang="en-US" sz="900">
+                <a:solidFill>
+                  <a:srgbClr val="D43C2C"/>
+                </a:solidFill>
+                <a:uFillTx/>
+              </a:rPr>
+              <a:t>东到长宁路、安西路、武夷路接邻江苏路街道，北到苏州河接邻普陀区</a:t>
+            </a:r>
+            <a:r>
+              <a:rPr lang="zh-CN" altLang="en-US" sz="900"/>
+              <a:t>。面积2.04平方公里，户籍人口7.04万人（2008年），下辖21个居委会。华阳路街道的主要街道长宁路和定西路，构成繁华的中山公园商圈。辖区内的圣约翰大学旧址（今华东政法大学）、中山公园，是愚园路历史文化风貌区的重要组成部分。</a:t>
+            </a:r>
+            <a:endParaRPr lang="zh-CN" altLang="en-US" sz="900"/>
+          </a:p>
+        </p:txBody>
+      </p:sp>
+      <p:sp>
+        <p:nvSpPr>
+          <p:cNvPr id="17" name="Text Box 16"/>
+          <p:cNvSpPr txBox="true"/>
+          <p:nvPr/>
+        </p:nvSpPr>
+        <p:spPr>
+          <a:xfrm>
+            <a:off x="261620" y="3963035"/>
+            <a:ext cx="4057015" cy="229870"/>
+          </a:xfrm>
+          <a:prstGeom prst="rect">
+            <a:avLst/>
+          </a:prstGeom>
+          <a:noFill/>
+        </p:spPr>
+        <p:txBody>
+          <a:bodyPr wrap="square" rtlCol="0">
+            <a:spAutoFit/>
+          </a:bodyPr>
+          <a:p>
+            <a:r>
+              <a:rPr lang="zh-CN" altLang="en-US" sz="900">
+                <a:solidFill>
+                  <a:schemeClr val="tx1"/>
+                </a:solidFill>
+                <a:uFillTx/>
+              </a:rPr>
+              <a:t>问题：华阳路街道四周相连的是什么地方？</a:t>
+            </a:r>
+            <a:endParaRPr lang="zh-CN" altLang="en-US" sz="900">
+              <a:solidFill>
+                <a:schemeClr val="tx1"/>
+              </a:solidFill>
+              <a:uFillTx/>
+            </a:endParaRPr>
+          </a:p>
+        </p:txBody>
+      </p:sp>
+      <p:sp>
+        <p:nvSpPr>
+          <p:cNvPr id="19" name="Text Box 18"/>
+          <p:cNvSpPr txBox="true"/>
+          <p:nvPr/>
+        </p:nvSpPr>
+        <p:spPr>
+          <a:xfrm>
+            <a:off x="1488440" y="4192905"/>
+            <a:ext cx="1454785" cy="299085"/>
+          </a:xfrm>
+          <a:prstGeom prst="rect">
+            <a:avLst/>
+          </a:prstGeom>
+          <a:noFill/>
+        </p:spPr>
+        <p:txBody>
+          <a:bodyPr wrap="square" rtlCol="0">
+            <a:spAutoFit/>
+          </a:bodyPr>
+          <a:p>
+            <a:r>
+              <a:rPr lang="zh-CN" altLang="en-US"/>
+              <a:t>正样本</a:t>
+            </a:r>
+            <a:endParaRPr lang="zh-CN" altLang="en-US"/>
+          </a:p>
+        </p:txBody>
+      </p:sp>
+      <p:sp>
+        <p:nvSpPr>
+          <p:cNvPr id="35" name="圆角矩形 8"/>
+          <p:cNvSpPr>
+            <a:spLocks noChangeArrowheads="true"/>
+          </p:cNvSpPr>
+          <p:nvPr/>
+        </p:nvSpPr>
+        <p:spPr bwMode="auto">
+          <a:xfrm>
+            <a:off x="4686300" y="2815590"/>
+            <a:ext cx="4320540" cy="1377315"/>
+          </a:xfrm>
+          <a:prstGeom prst="roundRect">
+            <a:avLst>
+              <a:gd name="adj" fmla="val 4324"/>
+            </a:avLst>
+          </a:prstGeom>
+          <a:solidFill>
+            <a:srgbClr val="F2F2F2"/>
+          </a:solidFill>
+          <a:ln w="9525">
+            <a:solidFill>
+              <a:schemeClr val="tx1"/>
+            </a:solidFill>
+            <a:round/>
+          </a:ln>
+        </p:spPr>
+        <p:txBody>
+          <a:bodyPr/>
+          <a:lstStyle>
+            <a:lvl1pPr eaLnBrk="0" hangingPunct="0">
+              <a:defRPr>
+                <a:solidFill>
+                  <a:schemeClr val="tx1"/>
+                </a:solidFill>
+                <a:latin typeface="Arial" panose="02080604020202020204" pitchFamily="34" charset="0"/>
+                <a:ea typeface="宋体" pitchFamily="2" charset="-122"/>
+              </a:defRPr>
+            </a:lvl1pPr>
+            <a:lvl2pPr eaLnBrk="0" hangingPunct="0">
+              <a:defRPr>
+                <a:solidFill>
+                  <a:schemeClr val="tx1"/>
+                </a:solidFill>
+                <a:latin typeface="Arial" panose="02080604020202020204" pitchFamily="34" charset="0"/>
+                <a:ea typeface="宋体" pitchFamily="2" charset="-122"/>
+              </a:defRPr>
+            </a:lvl2pPr>
+            <a:lvl3pPr eaLnBrk="0" hangingPunct="0">
+              <a:defRPr>
+                <a:solidFill>
+                  <a:schemeClr val="tx1"/>
+                </a:solidFill>
+                <a:latin typeface="Arial" panose="02080604020202020204" pitchFamily="34" charset="0"/>
+                <a:ea typeface="宋体" pitchFamily="2" charset="-122"/>
+              </a:defRPr>
+            </a:lvl3pPr>
+            <a:lvl4pPr eaLnBrk="0" hangingPunct="0">
+              <a:defRPr>
+                <a:solidFill>
+                  <a:schemeClr val="tx1"/>
+                </a:solidFill>
+                <a:latin typeface="Arial" panose="02080604020202020204" pitchFamily="34" charset="0"/>
+                <a:ea typeface="宋体" pitchFamily="2" charset="-122"/>
+              </a:defRPr>
+            </a:lvl4pPr>
+            <a:lvl5pPr eaLnBrk="0" hangingPunct="0">
+              <a:defRPr>
+                <a:solidFill>
+                  <a:schemeClr val="tx1"/>
+                </a:solidFill>
+                <a:latin typeface="Arial" panose="02080604020202020204" pitchFamily="34" charset="0"/>
+                <a:ea typeface="宋体" pitchFamily="2" charset="-122"/>
+              </a:defRPr>
+            </a:lvl5pPr>
+            <a:lvl6pPr eaLnBrk="0" fontAlgn="base" hangingPunct="0">
+              <a:spcBef>
+                <a:spcPct val="0"/>
+              </a:spcBef>
+              <a:spcAft>
+                <a:spcPct val="0"/>
+              </a:spcAft>
+              <a:buFont typeface="Arial" panose="02080604020202020204" pitchFamily="34" charset="0"/>
+              <a:defRPr>
+                <a:solidFill>
+                  <a:schemeClr val="tx1"/>
+                </a:solidFill>
+                <a:latin typeface="Arial" panose="02080604020202020204" pitchFamily="34" charset="0"/>
+                <a:ea typeface="宋体" pitchFamily="2" charset="-122"/>
+              </a:defRPr>
+            </a:lvl6pPr>
+            <a:lvl7pPr eaLnBrk="0" fontAlgn="base" hangingPunct="0">
+              <a:spcBef>
+                <a:spcPct val="0"/>
+              </a:spcBef>
+              <a:spcAft>
+                <a:spcPct val="0"/>
+              </a:spcAft>
+              <a:buFont typeface="Arial" panose="02080604020202020204" pitchFamily="34" charset="0"/>
+              <a:defRPr>
+                <a:solidFill>
+                  <a:schemeClr val="tx1"/>
+                </a:solidFill>
+                <a:latin typeface="Arial" panose="02080604020202020204" pitchFamily="34" charset="0"/>
+                <a:ea typeface="宋体" pitchFamily="2" charset="-122"/>
+              </a:defRPr>
+            </a:lvl7pPr>
+            <a:lvl8pPr eaLnBrk="0" fontAlgn="base" hangingPunct="0">
+              <a:spcBef>
+                <a:spcPct val="0"/>
+              </a:spcBef>
+              <a:spcAft>
+                <a:spcPct val="0"/>
+              </a:spcAft>
+              <a:buFont typeface="Arial" panose="02080604020202020204" pitchFamily="34" charset="0"/>
+              <a:defRPr>
+                <a:solidFill>
+                  <a:schemeClr val="tx1"/>
+                </a:solidFill>
+                <a:latin typeface="Arial" panose="02080604020202020204" pitchFamily="34" charset="0"/>
+                <a:ea typeface="宋体" pitchFamily="2" charset="-122"/>
+              </a:defRPr>
+            </a:lvl8pPr>
+            <a:lvl9pPr eaLnBrk="0" fontAlgn="base" hangingPunct="0">
+              <a:spcBef>
+                <a:spcPct val="0"/>
+              </a:spcBef>
+              <a:spcAft>
+                <a:spcPct val="0"/>
+              </a:spcAft>
+              <a:buFont typeface="Arial" panose="02080604020202020204" pitchFamily="34" charset="0"/>
+              <a:defRPr>
+                <a:solidFill>
+                  <a:schemeClr val="tx1"/>
+                </a:solidFill>
+                <a:latin typeface="Arial" panose="02080604020202020204" pitchFamily="34" charset="0"/>
+                <a:ea typeface="宋体" pitchFamily="2" charset="-122"/>
+              </a:defRPr>
+            </a:lvl9pPr>
+          </a:lstStyle>
+          <a:p>
+            <a:pPr eaLnBrk="1" hangingPunct="1"/>
+            <a:endParaRPr lang="zh-CN" altLang="en-US" sz="1350">
+              <a:solidFill>
+                <a:srgbClr val="C4261D"/>
+              </a:solidFill>
+            </a:endParaRPr>
+          </a:p>
+        </p:txBody>
+      </p:sp>
+      <p:cxnSp>
+        <p:nvCxnSpPr>
+          <p:cNvPr id="36" name="Straight Connector 35"/>
+          <p:cNvCxnSpPr/>
+          <p:nvPr/>
+        </p:nvCxnSpPr>
+        <p:spPr>
+          <a:xfrm>
+            <a:off x="4686300" y="3963035"/>
+            <a:ext cx="4236720" cy="8255"/>
+          </a:xfrm>
+          <a:prstGeom prst="line">
+            <a:avLst/>
+          </a:prstGeom>
+          <a:ln w="19050">
+            <a:solidFill>
+              <a:schemeClr val="tx1"/>
+            </a:solidFill>
+          </a:ln>
+        </p:spPr>
+        <p:style>
+          <a:lnRef idx="1">
+            <a:schemeClr val="accent1"/>
+          </a:lnRef>
+          <a:fillRef idx="0">
+            <a:schemeClr val="accent1"/>
+          </a:fillRef>
+          <a:effectRef idx="0">
+            <a:schemeClr val="accent1"/>
+          </a:effectRef>
+          <a:fontRef idx="minor">
+            <a:schemeClr val="tx1"/>
+          </a:fontRef>
+        </p:style>
+      </p:cxnSp>
+      <p:sp>
+        <p:nvSpPr>
+          <p:cNvPr id="37" name="Text Box 36"/>
+          <p:cNvSpPr txBox="true"/>
+          <p:nvPr/>
+        </p:nvSpPr>
+        <p:spPr>
+          <a:xfrm>
+            <a:off x="4705350" y="2954020"/>
+            <a:ext cx="4404360" cy="645160"/>
+          </a:xfrm>
+          <a:prstGeom prst="rect">
+            <a:avLst/>
+          </a:prstGeom>
+          <a:noFill/>
+        </p:spPr>
+        <p:txBody>
+          <a:bodyPr wrap="square" rtlCol="0">
+            <a:spAutoFit/>
+          </a:bodyPr>
+          <a:p>
+            <a:r>
+              <a:rPr lang="zh-CN" altLang="en-US" sz="900"/>
+              <a:t>文本段落：华阳路街道是中国上海市长宁区下辖的一个街道办事处，位于长宁区东部，</a:t>
+            </a:r>
+            <a:r>
+              <a:rPr lang="zh-CN" altLang="en-US" sz="900">
+                <a:solidFill>
+                  <a:srgbClr val="D43C2C"/>
+                </a:solidFill>
+                <a:uFillTx/>
+              </a:rPr>
+              <a:t>东到长宁路、安西路、武夷路接邻江苏路街道，北到苏州河接邻普陀区</a:t>
+            </a:r>
+            <a:r>
+              <a:rPr lang="zh-CN" altLang="en-US" sz="900"/>
+              <a:t>。面积2.04平方公里，户籍人口7.04万人（2008年），下辖21个居委会。上海市轨道交通二号线、三号线、四号线以该街道辖区的中山公园站为换乘枢纽。</a:t>
+            </a:r>
+            <a:endParaRPr lang="zh-CN" altLang="en-US" sz="900"/>
+          </a:p>
+        </p:txBody>
+      </p:sp>
+      <p:sp>
+        <p:nvSpPr>
+          <p:cNvPr id="38" name="Text Box 37"/>
+          <p:cNvSpPr txBox="true"/>
+          <p:nvPr/>
+        </p:nvSpPr>
+        <p:spPr>
+          <a:xfrm>
+            <a:off x="4686300" y="3963035"/>
+            <a:ext cx="4057015" cy="229870"/>
+          </a:xfrm>
+          <a:prstGeom prst="rect">
+            <a:avLst/>
+          </a:prstGeom>
+          <a:noFill/>
+        </p:spPr>
+        <p:txBody>
+          <a:bodyPr wrap="square" rtlCol="0">
+            <a:spAutoFit/>
+          </a:bodyPr>
+          <a:p>
+            <a:r>
+              <a:rPr lang="zh-CN" altLang="en-US" sz="900">
+                <a:solidFill>
+                  <a:schemeClr val="tx1"/>
+                </a:solidFill>
+                <a:uFillTx/>
+              </a:rPr>
+              <a:t>问题：华阳路街道四周相连的是什么地方？</a:t>
+            </a:r>
+            <a:endParaRPr lang="zh-CN" altLang="en-US" sz="900">
+              <a:solidFill>
+                <a:schemeClr val="tx1"/>
+              </a:solidFill>
+              <a:uFillTx/>
+            </a:endParaRPr>
+          </a:p>
+        </p:txBody>
+      </p:sp>
+      <p:sp>
+        <p:nvSpPr>
+          <p:cNvPr id="39" name="Text Box 38"/>
+          <p:cNvSpPr txBox="true"/>
+          <p:nvPr/>
+        </p:nvSpPr>
+        <p:spPr>
+          <a:xfrm>
+            <a:off x="5913120" y="4192905"/>
+            <a:ext cx="1454785" cy="299085"/>
+          </a:xfrm>
+          <a:prstGeom prst="rect">
+            <a:avLst/>
+          </a:prstGeom>
+          <a:noFill/>
+        </p:spPr>
+        <p:txBody>
+          <a:bodyPr wrap="square" rtlCol="0">
+            <a:spAutoFit/>
+          </a:bodyPr>
+          <a:p>
+            <a:r>
+              <a:rPr lang="zh-CN" altLang="en-US"/>
+              <a:t>正样本</a:t>
+            </a:r>
+            <a:endParaRPr lang="zh-CN" altLang="en-US"/>
+          </a:p>
+        </p:txBody>
+      </p:sp>
+    </p:spTree>
+  </p:cSld>
+  <p:clrMapOvr>
+    <a:masterClrMapping/>
+  </p:clrMapOvr>
+  <mc:AlternateContent xmlns:mc="http://schemas.openxmlformats.org/markup-compatibility/2006">
+    <mc:Choice xmlns:p14="http://schemas.microsoft.com/office/powerpoint/2010/main" Requires="p14">
+      <p:transition spd="slow" p14:dur="2000"/>
+    </mc:Choice>
+    <mc:Fallback>
+      <p:transition spd="slow"/>
+    </mc:Fallback>
+  </mc:AlternateContent>
+  <p:timing>
+    <p:tnLst>
+      <p:par>
+        <p:cTn id="1" dur="indefinite" restart="never" nodeType="tmRoot"/>
+      </p:par>
+    </p:tnLst>
+  </p:timing>
+</p:sld>
+</file>
+
+<file path=ppt/slides/slide22.xml><?xml version="1.0" encoding="utf-8"?>
+<p:sld xmlns:a="http://schemas.openxmlformats.org/drawingml/2006/main" xmlns:r="http://schemas.openxmlformats.org/officeDocument/2006/relationships" xmlns:p="http://schemas.openxmlformats.org/presentationml/2006/main">
+  <p:cSld>
+    <p:bg>
+      <p:bgPr>
+        <a:blipFill dpi="0" rotWithShape="true">
+          <a:blip r:embed="rId1"/>
+          <a:srcRect/>
+        </a:blipFill>
+        <a:effectLst/>
+      </p:bgPr>
+    </p:bg>
+    <p:spTree>
+      <p:nvGrpSpPr>
+        <p:cNvPr id="1" name=""/>
+        <p:cNvGrpSpPr/>
+        <p:nvPr/>
+      </p:nvGrpSpPr>
+      <p:grpSpPr>
+        <a:xfrm>
+          <a:off x="0" y="0"/>
+          <a:ext cx="0" cy="0"/>
+          <a:chOff x="0" y="0"/>
+          <a:chExt cx="0" cy="0"/>
+        </a:xfrm>
+      </p:grpSpPr>
+      <p:pic>
+        <p:nvPicPr>
+          <p:cNvPr id="2" name="图片 3"/>
+          <p:cNvPicPr>
+            <a:picLocks noChangeAspect="true"/>
+          </p:cNvPicPr>
+          <p:nvPr/>
+        </p:nvPicPr>
+        <p:blipFill>
+          <a:blip r:embed="rId2" cstate="print">
+            <a:extLst>
+              <a:ext uri="{28A0092B-C50C-407E-A947-70E740481C1C}">
+                <a14:useLocalDpi xmlns:a14="http://schemas.microsoft.com/office/drawing/2010/main" val="false"/>
+              </a:ext>
+            </a:extLst>
+          </a:blip>
+          <a:stretch>
+            <a:fillRect/>
+          </a:stretch>
+        </p:blipFill>
+        <p:spPr>
+          <a:xfrm>
+            <a:off x="7608408" y="122473"/>
+            <a:ext cx="1467011" cy="491720"/>
+          </a:xfrm>
+          <a:prstGeom prst="rect">
+            <a:avLst/>
+          </a:prstGeom>
+        </p:spPr>
+      </p:pic>
+      <p:sp>
+        <p:nvSpPr>
+          <p:cNvPr id="3" name="Text Box 2"/>
+          <p:cNvSpPr txBox="true"/>
+          <p:nvPr/>
+        </p:nvSpPr>
+        <p:spPr>
+          <a:xfrm>
+            <a:off x="508635" y="194310"/>
+            <a:ext cx="2943225" cy="583565"/>
+          </a:xfrm>
+          <a:prstGeom prst="rect">
+            <a:avLst/>
+          </a:prstGeom>
+          <a:noFill/>
+        </p:spPr>
+        <p:txBody>
+          <a:bodyPr wrap="square" rtlCol="0">
+            <a:spAutoFit/>
+          </a:bodyPr>
+          <a:p>
+            <a:r>
+              <a:rPr lang="zh-CN" altLang="en-US" sz="3200">
+                <a:ln w="12700">
+                  <a:solidFill>
+                    <a:schemeClr val="tx2">
+                      <a:lumMod val="75000"/>
+                    </a:schemeClr>
+                  </a:solidFill>
+                  <a:prstDash val="solid"/>
+                </a:ln>
+                <a:pattFill prst="dkUpDiag">
+                  <a:fgClr>
+                    <a:schemeClr val="tx2"/>
+                  </a:fgClr>
+                  <a:bgClr>
+                    <a:schemeClr val="tx2">
+                      <a:lumMod val="20000"/>
+                      <a:lumOff val="80000"/>
+                    </a:schemeClr>
+                  </a:bgClr>
+                </a:pattFill>
+                <a:effectLst>
+                  <a:outerShdw dist="38100" dir="2640000" algn="bl" rotWithShape="0">
+                    <a:schemeClr val="tx2">
+                      <a:lumMod val="75000"/>
+                    </a:schemeClr>
+                  </a:outerShdw>
+                </a:effectLst>
+              </a:rPr>
+              <a:t>已完成进度</a:t>
+            </a:r>
+            <a:endParaRPr lang="zh-CN" altLang="en-US" sz="3200">
+              <a:ln w="12700">
+                <a:solidFill>
+                  <a:schemeClr val="tx2">
+                    <a:lumMod val="75000"/>
+                  </a:schemeClr>
+                </a:solidFill>
+                <a:prstDash val="solid"/>
+              </a:ln>
+              <a:pattFill prst="dkUpDiag">
+                <a:fgClr>
+                  <a:schemeClr val="tx2"/>
+                </a:fgClr>
+                <a:bgClr>
+                  <a:schemeClr val="tx2">
+                    <a:lumMod val="20000"/>
+                    <a:lumOff val="80000"/>
+                  </a:schemeClr>
+                </a:bgClr>
+              </a:pattFill>
+              <a:effectLst>
+                <a:outerShdw dist="38100" dir="2640000" algn="bl" rotWithShape="0">
+                  <a:schemeClr val="tx2">
+                    <a:lumMod val="75000"/>
+                  </a:schemeClr>
+                </a:outerShdw>
+              </a:effectLst>
+            </a:endParaRPr>
+          </a:p>
+        </p:txBody>
+      </p:sp>
+      <p:sp>
+        <p:nvSpPr>
+          <p:cNvPr id="6" name="Text Box 5"/>
+          <p:cNvSpPr txBox="true"/>
+          <p:nvPr/>
+        </p:nvSpPr>
+        <p:spPr>
+          <a:xfrm>
+            <a:off x="5195570" y="4758690"/>
+            <a:ext cx="3811270" cy="299085"/>
+          </a:xfrm>
+          <a:prstGeom prst="rect">
+            <a:avLst/>
+          </a:prstGeom>
+          <a:noFill/>
+        </p:spPr>
+        <p:txBody>
+          <a:bodyPr wrap="square" rtlCol="0">
+            <a:spAutoFit/>
+          </a:bodyPr>
+          <a:p>
+            <a:r>
+              <a:rPr lang="zh-CN" altLang="en-US" b="1">
+                <a:sym typeface="+mn-ea"/>
+              </a:rPr>
+              <a:t>基于阅读理解形式的中文问答系统研究与实现</a:t>
+            </a:r>
+            <a:endParaRPr lang="en-US"/>
+          </a:p>
+        </p:txBody>
+      </p:sp>
+      <p:sp>
+        <p:nvSpPr>
+          <p:cNvPr id="20" name="Text Box 19"/>
+          <p:cNvSpPr txBox="true"/>
+          <p:nvPr/>
+        </p:nvSpPr>
+        <p:spPr>
+          <a:xfrm>
+            <a:off x="2493010" y="1943735"/>
+            <a:ext cx="3373120" cy="299085"/>
+          </a:xfrm>
+          <a:prstGeom prst="rect">
+            <a:avLst/>
+          </a:prstGeom>
+          <a:noFill/>
+        </p:spPr>
+        <p:txBody>
+          <a:bodyPr wrap="square" rtlCol="0">
+            <a:spAutoFit/>
+          </a:bodyPr>
+          <a:p>
+            <a:r>
+              <a:rPr lang="zh-CN" altLang="en-US"/>
+              <a:t>最后得到的负样本数目：</a:t>
+            </a:r>
+            <a:r>
+              <a:rPr lang="" altLang="zh-CN"/>
+              <a:t>430136</a:t>
+            </a:r>
+            <a:endParaRPr lang="" altLang="zh-CN"/>
+          </a:p>
+        </p:txBody>
+      </p:sp>
+      <p:sp>
+        <p:nvSpPr>
+          <p:cNvPr id="21" name="Text Box 20"/>
+          <p:cNvSpPr txBox="true"/>
+          <p:nvPr/>
+        </p:nvSpPr>
+        <p:spPr>
+          <a:xfrm>
+            <a:off x="2693035" y="2414905"/>
+            <a:ext cx="2749550" cy="299085"/>
+          </a:xfrm>
+          <a:prstGeom prst="rect">
+            <a:avLst/>
+          </a:prstGeom>
+          <a:noFill/>
+        </p:spPr>
+        <p:txBody>
+          <a:bodyPr wrap="square" rtlCol="0">
+            <a:spAutoFit/>
+          </a:bodyPr>
+          <a:p>
+            <a:r>
+              <a:rPr lang="" altLang="en-US"/>
+              <a:t>Pesudo examples: </a:t>
+            </a:r>
+            <a:r>
+              <a:rPr lang="en-US"/>
+              <a:t>12716</a:t>
+            </a:r>
+            <a:endParaRPr lang="en-US"/>
+          </a:p>
+        </p:txBody>
+      </p:sp>
+    </p:spTree>
+  </p:cSld>
+  <p:clrMapOvr>
+    <a:masterClrMapping/>
+  </p:clrMapOvr>
+  <mc:AlternateContent xmlns:mc="http://schemas.openxmlformats.org/markup-compatibility/2006">
+    <mc:Choice xmlns:p14="http://schemas.microsoft.com/office/powerpoint/2010/main" Requires="p14">
+      <p:transition spd="slow" p14:dur="2000"/>
+    </mc:Choice>
+    <mc:Fallback>
+      <p:transition spd="slow"/>
+    </mc:Fallback>
+  </mc:AlternateContent>
+  <p:timing>
+    <p:tnLst>
+      <p:par>
+        <p:cTn id="1" dur="indefinite" restart="never" nodeType="tmRoot"/>
+      </p:par>
+    </p:tnLst>
+  </p:timing>
+</p:sld>
+</file>
+
+<file path=ppt/slides/slide23.xml><?xml version="1.0" encoding="utf-8"?>
+<p:sld xmlns:a="http://schemas.openxmlformats.org/drawingml/2006/main" xmlns:r="http://schemas.openxmlformats.org/officeDocument/2006/relationships" xmlns:p="http://schemas.openxmlformats.org/presentationml/2006/main">
+  <p:cSld>
+    <p:bg>
+      <p:bgPr>
+        <a:blipFill dpi="0" rotWithShape="true">
+          <a:blip r:embed="rId1"/>
+          <a:srcRect/>
+        </a:blipFill>
+        <a:effectLst/>
+      </p:bgPr>
+    </p:bg>
+    <p:spTree>
+      <p:nvGrpSpPr>
+        <p:cNvPr id="1" name=""/>
+        <p:cNvGrpSpPr/>
+        <p:nvPr/>
+      </p:nvGrpSpPr>
+      <p:grpSpPr>
+        <a:xfrm>
+          <a:off x="0" y="0"/>
+          <a:ext cx="0" cy="0"/>
+          <a:chOff x="0" y="0"/>
+          <a:chExt cx="0" cy="0"/>
+        </a:xfrm>
+      </p:grpSpPr>
+      <p:pic>
+        <p:nvPicPr>
+          <p:cNvPr id="2" name="图片 3"/>
+          <p:cNvPicPr>
+            <a:picLocks noChangeAspect="true"/>
+          </p:cNvPicPr>
+          <p:nvPr/>
+        </p:nvPicPr>
+        <p:blipFill>
+          <a:blip r:embed="rId2" cstate="print">
+            <a:extLst>
+              <a:ext uri="{28A0092B-C50C-407E-A947-70E740481C1C}">
+                <a14:useLocalDpi xmlns:a14="http://schemas.microsoft.com/office/drawing/2010/main" val="false"/>
+              </a:ext>
+            </a:extLst>
+          </a:blip>
+          <a:stretch>
+            <a:fillRect/>
+          </a:stretch>
+        </p:blipFill>
+        <p:spPr>
+          <a:xfrm>
+            <a:off x="7608408" y="122473"/>
+            <a:ext cx="1467011" cy="491720"/>
+          </a:xfrm>
+          <a:prstGeom prst="rect">
+            <a:avLst/>
+          </a:prstGeom>
+        </p:spPr>
+      </p:pic>
+      <p:sp>
+        <p:nvSpPr>
           <p:cNvPr id="62" name="椭圆 61"/>
           <p:cNvSpPr/>
           <p:nvPr/>
@@ -18407,7 +20215,7 @@
 </p:sld>
 </file>
 
-<file path=ppt/slides/slide22.xml><?xml version="1.0" encoding="utf-8"?>
+<file path=ppt/slides/slide24.xml><?xml version="1.0" encoding="utf-8"?>
 <p:sld xmlns:a="http://schemas.openxmlformats.org/drawingml/2006/main" xmlns:r="http://schemas.openxmlformats.org/officeDocument/2006/relationships" xmlns:p="http://schemas.openxmlformats.org/presentationml/2006/main">
   <p:cSld>
     <p:bg>
@@ -18628,7 +20436,7 @@
 </p:sld>
 </file>
 
-<file path=ppt/slides/slide23.xml><?xml version="1.0" encoding="utf-8"?>
+<file path=ppt/slides/slide25.xml><?xml version="1.0" encoding="utf-8"?>
 <p:sld xmlns:a="http://schemas.openxmlformats.org/drawingml/2006/main" xmlns:r="http://schemas.openxmlformats.org/officeDocument/2006/relationships" xmlns:p="http://schemas.openxmlformats.org/presentationml/2006/main">
   <p:cSld>
     <p:bg>
@@ -19284,7 +21092,7 @@
 </p:sld>
 </file>
 
-<file path=ppt/slides/slide24.xml><?xml version="1.0" encoding="utf-8"?>
+<file path=ppt/slides/slide26.xml><?xml version="1.0" encoding="utf-8"?>
 <p:sld xmlns:a="http://schemas.openxmlformats.org/drawingml/2006/main" xmlns:r="http://schemas.openxmlformats.org/officeDocument/2006/relationships" xmlns:p="http://schemas.openxmlformats.org/presentationml/2006/main">
   <p:cSld>
     <p:bg>
@@ -19450,7 +21258,7 @@
 </p:sld>
 </file>
 
-<file path=ppt/slides/slide25.xml><?xml version="1.0" encoding="utf-8"?>
+<file path=ppt/slides/slide27.xml><?xml version="1.0" encoding="utf-8"?>
 <p:sld xmlns:a="http://schemas.openxmlformats.org/drawingml/2006/main" xmlns:r="http://schemas.openxmlformats.org/officeDocument/2006/relationships" xmlns:p="http://schemas.openxmlformats.org/presentationml/2006/main">
   <p:cSld>
     <p:bg>
@@ -19559,7 +21367,7 @@
 </p:sld>
 </file>
 
-<file path=ppt/slides/slide26.xml><?xml version="1.0" encoding="utf-8"?>
+<file path=ppt/slides/slide28.xml><?xml version="1.0" encoding="utf-8"?>
 <p:sld xmlns:a="http://schemas.openxmlformats.org/drawingml/2006/main" xmlns:r="http://schemas.openxmlformats.org/officeDocument/2006/relationships" xmlns:p="http://schemas.openxmlformats.org/presentationml/2006/main">
   <p:cSld>
     <p:bg>
@@ -19668,7 +21476,7 @@
 </p:sld>
 </file>
 
-<file path=ppt/slides/slide27.xml><?xml version="1.0" encoding="utf-8"?>
+<file path=ppt/slides/slide29.xml><?xml version="1.0" encoding="utf-8"?>
 <p:sld xmlns:a="http://schemas.openxmlformats.org/drawingml/2006/main" xmlns:r="http://schemas.openxmlformats.org/officeDocument/2006/relationships" xmlns:p="http://schemas.openxmlformats.org/presentationml/2006/main">
   <p:cSld>
     <p:bg>
@@ -19761,177 +21569,6 @@
           </a:prstGeom>
         </p:spPr>
       </p:pic>
-    </p:spTree>
-  </p:cSld>
-  <p:clrMapOvr>
-    <a:masterClrMapping/>
-  </p:clrMapOvr>
-  <mc:AlternateContent xmlns:mc="http://schemas.openxmlformats.org/markup-compatibility/2006">
-    <mc:Choice xmlns:p14="http://schemas.microsoft.com/office/powerpoint/2010/main" Requires="p14">
-      <p:transition spd="slow" p14:dur="2000" advTm="3000"/>
-    </mc:Choice>
-    <mc:Fallback>
-      <p:transition spd="slow" advTm="3000"/>
-    </mc:Fallback>
-  </mc:AlternateContent>
-</p:sld>
-</file>
-
-<file path=ppt/slides/slide28.xml><?xml version="1.0" encoding="utf-8"?>
-<p:sld xmlns:a="http://schemas.openxmlformats.org/drawingml/2006/main" xmlns:r="http://schemas.openxmlformats.org/officeDocument/2006/relationships" xmlns:p="http://schemas.openxmlformats.org/presentationml/2006/main">
-  <p:cSld>
-    <p:bg>
-      <p:bgPr>
-        <a:blipFill dpi="0" rotWithShape="true">
-          <a:blip r:embed="rId1"/>
-          <a:srcRect/>
-        </a:blipFill>
-        <a:effectLst/>
-      </p:bgPr>
-    </p:bg>
-    <p:spTree>
-      <p:nvGrpSpPr>
-        <p:cNvPr id="1" name=""/>
-        <p:cNvGrpSpPr/>
-        <p:nvPr/>
-      </p:nvGrpSpPr>
-      <p:grpSpPr/>
-      <p:sp>
-        <p:nvSpPr>
-          <p:cNvPr id="2" name="Title 1"/>
-          <p:cNvSpPr>
-            <a:spLocks noGrp="true"/>
-          </p:cNvSpPr>
-          <p:nvPr>
-            <p:ph type="title"/>
-          </p:nvPr>
-        </p:nvSpPr>
-        <p:spPr/>
-        <p:txBody>
-          <a:bodyPr/>
-          <a:p>
-            <a:endParaRPr lang="en-US"/>
-          </a:p>
-        </p:txBody>
-      </p:sp>
-      <p:pic>
-        <p:nvPicPr>
-          <p:cNvPr id="7" name="图片 3"/>
-          <p:cNvPicPr>
-            <a:picLocks noChangeAspect="true"/>
-          </p:cNvPicPr>
-          <p:nvPr/>
-        </p:nvPicPr>
-        <p:blipFill>
-          <a:blip r:embed="rId2" cstate="print">
-            <a:extLst>
-              <a:ext uri="{28A0092B-C50C-407E-A947-70E740481C1C}">
-                <a14:useLocalDpi xmlns:a14="http://schemas.microsoft.com/office/drawing/2010/main" val="false"/>
-              </a:ext>
-            </a:extLst>
-          </a:blip>
-          <a:stretch>
-            <a:fillRect/>
-          </a:stretch>
-        </p:blipFill>
-        <p:spPr>
-          <a:xfrm>
-            <a:off x="7600315" y="100330"/>
-            <a:ext cx="1467485" cy="490220"/>
-          </a:xfrm>
-          <a:prstGeom prst="rect">
-            <a:avLst/>
-          </a:prstGeom>
-        </p:spPr>
-      </p:pic>
-      <p:pic>
-        <p:nvPicPr>
-          <p:cNvPr id="4" name="内容占位符 3" descr="2020-11-12 08-27-24 的屏幕截图"/>
-          <p:cNvPicPr>
-            <a:picLocks noChangeAspect="true"/>
-          </p:cNvPicPr>
-          <p:nvPr>
-            <p:ph idx="1"/>
-          </p:nvPr>
-        </p:nvPicPr>
-        <p:blipFill>
-          <a:blip r:embed="rId3"/>
-          <a:stretch>
-            <a:fillRect/>
-          </a:stretch>
-        </p:blipFill>
-        <p:spPr>
-          <a:xfrm>
-            <a:off x="1050925" y="1774825"/>
-            <a:ext cx="6603365" cy="2305685"/>
-          </a:xfrm>
-          <a:prstGeom prst="rect">
-            <a:avLst/>
-          </a:prstGeom>
-        </p:spPr>
-      </p:pic>
-    </p:spTree>
-  </p:cSld>
-  <p:clrMapOvr>
-    <a:masterClrMapping/>
-  </p:clrMapOvr>
-  <mc:AlternateContent xmlns:mc="http://schemas.openxmlformats.org/markup-compatibility/2006">
-    <mc:Choice xmlns:p14="http://schemas.microsoft.com/office/powerpoint/2010/main" Requires="p14">
-      <p:transition spd="slow" p14:dur="2000" advTm="3000"/>
-    </mc:Choice>
-    <mc:Fallback>
-      <p:transition spd="slow" advTm="3000"/>
-    </mc:Fallback>
-  </mc:AlternateContent>
-</p:sld>
-</file>
-
-<file path=ppt/slides/slide29.xml><?xml version="1.0" encoding="utf-8"?>
-<p:sld xmlns:a="http://schemas.openxmlformats.org/drawingml/2006/main" xmlns:r="http://schemas.openxmlformats.org/officeDocument/2006/relationships" xmlns:p="http://schemas.openxmlformats.org/presentationml/2006/main">
-  <p:cSld>
-    <p:spTree>
-      <p:nvGrpSpPr>
-        <p:cNvPr id="1" name=""/>
-        <p:cNvGrpSpPr/>
-        <p:nvPr/>
-      </p:nvGrpSpPr>
-      <p:grpSpPr/>
-      <p:sp>
-        <p:nvSpPr>
-          <p:cNvPr id="2" name="Title 1"/>
-          <p:cNvSpPr>
-            <a:spLocks noGrp="true"/>
-          </p:cNvSpPr>
-          <p:nvPr>
-            <p:ph type="title"/>
-          </p:nvPr>
-        </p:nvSpPr>
-        <p:spPr/>
-        <p:txBody>
-          <a:bodyPr/>
-          <a:p>
-            <a:endParaRPr lang="en-US"/>
-          </a:p>
-        </p:txBody>
-      </p:sp>
-      <p:sp>
-        <p:nvSpPr>
-          <p:cNvPr id="3" name="Content Placeholder 2"/>
-          <p:cNvSpPr>
-            <a:spLocks noGrp="true"/>
-          </p:cNvSpPr>
-          <p:nvPr>
-            <p:ph idx="1"/>
-          </p:nvPr>
-        </p:nvSpPr>
-        <p:spPr/>
-        <p:txBody>
-          <a:bodyPr/>
-          <a:p>
-            <a:endParaRPr lang="en-US"/>
-          </a:p>
-        </p:txBody>
-      </p:sp>
     </p:spTree>
   </p:cSld>
   <p:clrMapOvr>
@@ -20954,6 +22591,177 @@
       </p:par>
     </p:tnLst>
   </p:timing>
+</p:sld>
+</file>
+
+<file path=ppt/slides/slide30.xml><?xml version="1.0" encoding="utf-8"?>
+<p:sld xmlns:a="http://schemas.openxmlformats.org/drawingml/2006/main" xmlns:r="http://schemas.openxmlformats.org/officeDocument/2006/relationships" xmlns:p="http://schemas.openxmlformats.org/presentationml/2006/main">
+  <p:cSld>
+    <p:bg>
+      <p:bgPr>
+        <a:blipFill dpi="0" rotWithShape="true">
+          <a:blip r:embed="rId1"/>
+          <a:srcRect/>
+        </a:blipFill>
+        <a:effectLst/>
+      </p:bgPr>
+    </p:bg>
+    <p:spTree>
+      <p:nvGrpSpPr>
+        <p:cNvPr id="1" name=""/>
+        <p:cNvGrpSpPr/>
+        <p:nvPr/>
+      </p:nvGrpSpPr>
+      <p:grpSpPr/>
+      <p:sp>
+        <p:nvSpPr>
+          <p:cNvPr id="2" name="Title 1"/>
+          <p:cNvSpPr>
+            <a:spLocks noGrp="true"/>
+          </p:cNvSpPr>
+          <p:nvPr>
+            <p:ph type="title"/>
+          </p:nvPr>
+        </p:nvSpPr>
+        <p:spPr/>
+        <p:txBody>
+          <a:bodyPr/>
+          <a:p>
+            <a:endParaRPr lang="en-US"/>
+          </a:p>
+        </p:txBody>
+      </p:sp>
+      <p:pic>
+        <p:nvPicPr>
+          <p:cNvPr id="7" name="图片 3"/>
+          <p:cNvPicPr>
+            <a:picLocks noChangeAspect="true"/>
+          </p:cNvPicPr>
+          <p:nvPr/>
+        </p:nvPicPr>
+        <p:blipFill>
+          <a:blip r:embed="rId2" cstate="print">
+            <a:extLst>
+              <a:ext uri="{28A0092B-C50C-407E-A947-70E740481C1C}">
+                <a14:useLocalDpi xmlns:a14="http://schemas.microsoft.com/office/drawing/2010/main" val="false"/>
+              </a:ext>
+            </a:extLst>
+          </a:blip>
+          <a:stretch>
+            <a:fillRect/>
+          </a:stretch>
+        </p:blipFill>
+        <p:spPr>
+          <a:xfrm>
+            <a:off x="7600315" y="100330"/>
+            <a:ext cx="1467485" cy="490220"/>
+          </a:xfrm>
+          <a:prstGeom prst="rect">
+            <a:avLst/>
+          </a:prstGeom>
+        </p:spPr>
+      </p:pic>
+      <p:pic>
+        <p:nvPicPr>
+          <p:cNvPr id="4" name="内容占位符 3" descr="2020-11-12 08-27-24 的屏幕截图"/>
+          <p:cNvPicPr>
+            <a:picLocks noChangeAspect="true"/>
+          </p:cNvPicPr>
+          <p:nvPr>
+            <p:ph idx="1"/>
+          </p:nvPr>
+        </p:nvPicPr>
+        <p:blipFill>
+          <a:blip r:embed="rId3"/>
+          <a:stretch>
+            <a:fillRect/>
+          </a:stretch>
+        </p:blipFill>
+        <p:spPr>
+          <a:xfrm>
+            <a:off x="1050925" y="1774825"/>
+            <a:ext cx="6603365" cy="2305685"/>
+          </a:xfrm>
+          <a:prstGeom prst="rect">
+            <a:avLst/>
+          </a:prstGeom>
+        </p:spPr>
+      </p:pic>
+    </p:spTree>
+  </p:cSld>
+  <p:clrMapOvr>
+    <a:masterClrMapping/>
+  </p:clrMapOvr>
+  <mc:AlternateContent xmlns:mc="http://schemas.openxmlformats.org/markup-compatibility/2006">
+    <mc:Choice xmlns:p14="http://schemas.microsoft.com/office/powerpoint/2010/main" Requires="p14">
+      <p:transition spd="slow" p14:dur="2000" advTm="3000"/>
+    </mc:Choice>
+    <mc:Fallback>
+      <p:transition spd="slow" advTm="3000"/>
+    </mc:Fallback>
+  </mc:AlternateContent>
+</p:sld>
+</file>
+
+<file path=ppt/slides/slide31.xml><?xml version="1.0" encoding="utf-8"?>
+<p:sld xmlns:a="http://schemas.openxmlformats.org/drawingml/2006/main" xmlns:r="http://schemas.openxmlformats.org/officeDocument/2006/relationships" xmlns:p="http://schemas.openxmlformats.org/presentationml/2006/main">
+  <p:cSld>
+    <p:spTree>
+      <p:nvGrpSpPr>
+        <p:cNvPr id="1" name=""/>
+        <p:cNvGrpSpPr/>
+        <p:nvPr/>
+      </p:nvGrpSpPr>
+      <p:grpSpPr/>
+      <p:sp>
+        <p:nvSpPr>
+          <p:cNvPr id="2" name="Title 1"/>
+          <p:cNvSpPr>
+            <a:spLocks noGrp="true"/>
+          </p:cNvSpPr>
+          <p:nvPr>
+            <p:ph type="title"/>
+          </p:nvPr>
+        </p:nvSpPr>
+        <p:spPr/>
+        <p:txBody>
+          <a:bodyPr/>
+          <a:p>
+            <a:endParaRPr lang="en-US"/>
+          </a:p>
+        </p:txBody>
+      </p:sp>
+      <p:sp>
+        <p:nvSpPr>
+          <p:cNvPr id="3" name="Content Placeholder 2"/>
+          <p:cNvSpPr>
+            <a:spLocks noGrp="true"/>
+          </p:cNvSpPr>
+          <p:nvPr>
+            <p:ph idx="1"/>
+          </p:nvPr>
+        </p:nvSpPr>
+        <p:spPr/>
+        <p:txBody>
+          <a:bodyPr/>
+          <a:p>
+            <a:endParaRPr lang="en-US"/>
+          </a:p>
+        </p:txBody>
+      </p:sp>
+    </p:spTree>
+  </p:cSld>
+  <p:clrMapOvr>
+    <a:masterClrMapping/>
+  </p:clrMapOvr>
+  <mc:AlternateContent xmlns:mc="http://schemas.openxmlformats.org/markup-compatibility/2006">
+    <mc:Choice xmlns:p14="http://schemas.microsoft.com/office/powerpoint/2010/main" Requires="p14">
+      <p:transition spd="slow" p14:dur="2000" advTm="3000"/>
+    </mc:Choice>
+    <mc:Fallback>
+      <p:transition spd="slow" advTm="3000"/>
+    </mc:Fallback>
+  </mc:AlternateContent>
 </p:sld>
 </file>
 

</xml_diff>